<commit_message>
options de compilation +  répartition matin / aprem
</commit_message>
<xml_diff>
--- a/diapos/CPP_Intro.pptx
+++ b/diapos/CPP_Intro.pptx
@@ -2966,7 +2966,7 @@
             <a:pPr rtl="0"/>
             <a:fld id="{44067F72-4B43-4EB2-81AF-1356A084F97D}" type="datetime1">
               <a:rPr lang="fr-FR" smtClean="0"/>
-              <a:t>06/05/2021</a:t>
+              <a:t>15/06/2021</a:t>
             </a:fld>
             <a:endParaRPr lang="fr-FR" dirty="0"/>
           </a:p>
@@ -3148,7 +3148,7 @@
             <a:pPr rtl="0"/>
             <a:fld id="{18E2C9A5-1936-47C6-ADD2-56E91A3B7AD6}" type="datetime1">
               <a:rPr lang="fr-FR" noProof="0" smtClean="0"/>
-              <a:t>06/05/2021</a:t>
+              <a:t>15/06/2021</a:t>
             </a:fld>
             <a:endParaRPr lang="fr-FR" noProof="0" dirty="0"/>
           </a:p>
@@ -4025,7 +4025,7 @@
             <a:pPr rtl="0"/>
             <a:fld id="{95F14979-C768-4E40-879A-113D767D7598}" type="datetime1">
               <a:rPr lang="fr-FR" noProof="0" smtClean="0"/>
-              <a:t>06/05/2021</a:t>
+              <a:t>15/06/2021</a:t>
             </a:fld>
             <a:endParaRPr lang="fr-FR" noProof="0" dirty="0"/>
           </a:p>
@@ -4291,7 +4291,7 @@
             <a:pPr rtl="0"/>
             <a:fld id="{46AEB7E8-48A7-4B84-88AE-D5102810498A}" type="datetime1">
               <a:rPr lang="fr-FR" noProof="0" smtClean="0"/>
-              <a:t>06/05/2021</a:t>
+              <a:t>15/06/2021</a:t>
             </a:fld>
             <a:endParaRPr lang="fr-FR" noProof="0" dirty="0"/>
           </a:p>
@@ -4530,7 +4530,7 @@
             <a:pPr rtl="0"/>
             <a:fld id="{2FE4E01A-DB78-4E32-A009-59CFADEF770C}" type="datetime1">
               <a:rPr lang="fr-FR" noProof="0" smtClean="0"/>
-              <a:t>06/05/2021</a:t>
+              <a:t>15/06/2021</a:t>
             </a:fld>
             <a:endParaRPr lang="fr-FR" noProof="0" dirty="0"/>
           </a:p>
@@ -4779,7 +4779,7 @@
             <a:pPr rtl="0"/>
             <a:fld id="{3921C42B-897E-4F7D-9F30-7A616D683282}" type="datetime1">
               <a:rPr lang="fr-FR" noProof="0" smtClean="0"/>
-              <a:t>06/05/2021</a:t>
+              <a:t>15/06/2021</a:t>
             </a:fld>
             <a:endParaRPr lang="fr-FR" noProof="0" dirty="0"/>
           </a:p>
@@ -5098,7 +5098,7 @@
             <a:pPr rtl="0"/>
             <a:fld id="{666FD31E-62FB-4209-A7A6-BACD423FD1B9}" type="datetime1">
               <a:rPr lang="fr-FR" noProof="0" smtClean="0"/>
-              <a:t>06/05/2021</a:t>
+              <a:t>15/06/2021</a:t>
             </a:fld>
             <a:endParaRPr lang="fr-FR" noProof="0" dirty="0"/>
           </a:p>
@@ -5404,7 +5404,7 @@
             <a:pPr rtl="0"/>
             <a:fld id="{1F492094-CEAF-41CC-AA41-3DEA4E8B9F9C}" type="datetime1">
               <a:rPr lang="fr-FR" noProof="0" smtClean="0"/>
-              <a:t>06/05/2021</a:t>
+              <a:t>15/06/2021</a:t>
             </a:fld>
             <a:endParaRPr lang="fr-FR" noProof="0" dirty="0"/>
           </a:p>
@@ -5830,7 +5830,7 @@
             <a:pPr rtl="0"/>
             <a:fld id="{D1282008-B726-4AFB-BF47-1F66C441C4D1}" type="datetime1">
               <a:rPr lang="fr-FR" noProof="0" smtClean="0"/>
-              <a:t>06/05/2021</a:t>
+              <a:t>15/06/2021</a:t>
             </a:fld>
             <a:endParaRPr lang="fr-FR" noProof="0" dirty="0"/>
           </a:p>
@@ -5929,7 +5929,7 @@
             <a:pPr rtl="0"/>
             <a:fld id="{60565547-EAE3-42AF-9F0E-6706655F4F8F}" type="datetime1">
               <a:rPr lang="fr-FR" noProof="0" smtClean="0"/>
-              <a:t>06/05/2021</a:t>
+              <a:t>15/06/2021</a:t>
             </a:fld>
             <a:endParaRPr lang="fr-FR" noProof="0" dirty="0"/>
           </a:p>
@@ -6095,7 +6095,7 @@
             <a:pPr rtl="0"/>
             <a:fld id="{9D7570F7-C3C9-44B3-A009-658E4E9B6AED}" type="datetime1">
               <a:rPr lang="fr-FR" noProof="0" smtClean="0"/>
-              <a:t>06/05/2021</a:t>
+              <a:t>15/06/2021</a:t>
             </a:fld>
             <a:endParaRPr lang="fr-FR" noProof="0" dirty="0"/>
           </a:p>
@@ -6477,7 +6477,7 @@
             <a:pPr rtl="0"/>
             <a:fld id="{F981DFD8-7CC7-492D-8F3E-634F16593128}" type="datetime1">
               <a:rPr lang="fr-FR" noProof="0" smtClean="0"/>
-              <a:t>06/05/2021</a:t>
+              <a:t>15/06/2021</a:t>
             </a:fld>
             <a:endParaRPr lang="fr-FR" noProof="0" dirty="0"/>
           </a:p>
@@ -6770,7 +6770,7 @@
             <a:pPr rtl="0"/>
             <a:fld id="{097575A0-E176-45FF-AB41-901BA96C2E0F}" type="datetime1">
               <a:rPr lang="fr-FR" noProof="0" smtClean="0"/>
-              <a:t>06/05/2021</a:t>
+              <a:t>15/06/2021</a:t>
             </a:fld>
             <a:endParaRPr lang="fr-FR" noProof="0" dirty="0"/>
           </a:p>
@@ -6985,7 +6985,7 @@
             <a:pPr rtl="0"/>
             <a:fld id="{10358767-58E0-4259-BE08-C44246876B43}" type="datetime1">
               <a:rPr lang="fr-FR" noProof="0" smtClean="0"/>
-              <a:t>06/05/2021</a:t>
+              <a:t>15/06/2021</a:t>
             </a:fld>
             <a:endParaRPr lang="fr-FR" noProof="0" dirty="0"/>
           </a:p>
@@ -8717,7 +8717,6 @@
               <a:rPr lang="fr-FR" sz="2000" dirty="0" smtClean="0"/>
               <a:t>++ moderne</a:t>
             </a:r>
-            <a:endParaRPr lang="fr-FR" sz="2000" dirty="0" smtClean="0"/>
           </a:p>
           <a:p>
             <a:pPr marL="342900" lvl="1" indent="-342900">
@@ -8741,7 +8740,6 @@
               <a:rPr lang="fr-FR" sz="2000" dirty="0" smtClean="0"/>
               <a:t>Savoir produire un code propre, sûr, clair et maintenable</a:t>
             </a:r>
-            <a:endParaRPr lang="fr-FR" sz="2000" dirty="0" smtClean="0"/>
           </a:p>
           <a:p>
             <a:pPr marL="342900" lvl="1" indent="-342900">
@@ -8765,7 +8763,6 @@
               <a:rPr lang="fr-FR" sz="2000" dirty="0" smtClean="0"/>
               <a:t>Comprendre la chaine de compilation</a:t>
             </a:r>
-            <a:endParaRPr lang="fr-FR" sz="2000" dirty="0" smtClean="0"/>
           </a:p>
           <a:p>
             <a:pPr marL="342900" lvl="1" indent="-342900">
@@ -10884,8 +10881,26 @@
           <a:lstStyle/>
           <a:p>
             <a:r>
+              <a:rPr lang="fr-FR" sz="1400" dirty="0" smtClean="0"/>
+              <a:t>Connectez-vous au réseau WIFI « STORM R » avec vos </a:t>
+            </a:r>
+            <a:r>
+              <a:rPr lang="fr-FR" sz="1400" dirty="0" err="1" smtClean="0"/>
+              <a:t>credentials</a:t>
+            </a:r>
+            <a:r>
+              <a:rPr lang="fr-FR" sz="1400" dirty="0" smtClean="0"/>
+              <a:t> habituels</a:t>
+            </a:r>
+          </a:p>
+          <a:p>
+            <a:r>
+              <a:rPr lang="fr-FR" sz="1400" dirty="0" smtClean="0"/>
+              <a:t>Code </a:t>
+            </a:r>
+            <a:r>
               <a:rPr lang="fr-FR" sz="1400" dirty="0"/>
-              <a:t>Code et planches à récupérer sur GitHub</a:t>
+              <a:t>et planches à récupérer sur GitHub</a:t>
             </a:r>
             <a:br>
               <a:rPr lang="fr-FR" sz="1400" dirty="0"/>
@@ -10895,9 +10910,32 @@
               <a:t>git clone </a:t>
             </a:r>
             <a:r>
-              <a:rPr lang="fr-FR" sz="1100" dirty="0"/>
-              <a:t>https://github.com/franckginguene/hpc_formation_scalian.git</a:t>
-            </a:r>
+              <a:rPr lang="fr-FR" sz="1400" dirty="0" smtClean="0"/>
+              <a:t/>
+            </a:r>
+            <a:br>
+              <a:rPr lang="fr-FR" sz="1400" dirty="0" smtClean="0"/>
+            </a:br>
+            <a:r>
+              <a:rPr lang="fr-FR" sz="1600" dirty="0" smtClean="0"/>
+              <a:t>https</a:t>
+            </a:r>
+            <a:r>
+              <a:rPr lang="fr-FR" sz="1600" dirty="0"/>
+              <a:t>://github.com/franckginguene</a:t>
+            </a:r>
+            <a:r>
+              <a:rPr lang="fr-FR" sz="1600" dirty="0" smtClean="0"/>
+              <a:t>/</a:t>
+            </a:r>
+            <a:br>
+              <a:rPr lang="fr-FR" sz="1600" dirty="0" smtClean="0"/>
+            </a:br>
+            <a:r>
+              <a:rPr lang="fr-FR" sz="1600" dirty="0" err="1" smtClean="0"/>
+              <a:t>hpc_formation_scalian.git</a:t>
+            </a:r>
+            <a:endParaRPr lang="fr-FR" sz="1600" dirty="0"/>
           </a:p>
           <a:p>
             <a:endParaRPr lang="fr-FR" sz="1400" dirty="0"/>
@@ -11257,7 +11295,7 @@
         </p:blipFill>
         <p:spPr>
           <a:xfrm>
-            <a:off x="1409626" y="3739470"/>
+            <a:off x="1409626" y="3840433"/>
             <a:ext cx="2274751" cy="1112194"/>
           </a:xfrm>
           <a:prstGeom prst="rect">
@@ -12399,6 +12437,15 @@
 </file>
 
 <file path=customXml/item1.xml><?xml version="1.0" encoding="utf-8"?>
+<?mso-contentType ?>
+<FormTemplates xmlns="http://schemas.microsoft.com/sharepoint/v3/contenttype/forms">
+  <Display>DocumentLibraryForm</Display>
+  <Edit>DocumentLibraryForm</Edit>
+  <New>DocumentLibraryForm</New>
+</FormTemplates>
+</file>
+
+<file path=customXml/item2.xml><?xml version="1.0" encoding="utf-8"?>
 <ct:contentTypeSchema xmlns:ct="http://schemas.microsoft.com/office/2006/metadata/contentType" xmlns:ma="http://schemas.microsoft.com/office/2006/metadata/properties/metaAttributes" ct:_="" ma:_="" ma:contentTypeName="Document" ma:contentTypeID="0x01010079F111ED35F8CC479449609E8A0923A6" ma:contentTypeVersion="11" ma:contentTypeDescription="Create a new document." ma:contentTypeScope="" ma:versionID="9677210f24a1be23c92c90fd886aa0aa">
   <xsd:schema xmlns:xsd="http://www.w3.org/2001/XMLSchema" xmlns:xs="http://www.w3.org/2001/XMLSchema" xmlns:p="http://schemas.microsoft.com/office/2006/metadata/properties" xmlns:ns2="71af3243-3dd4-4a8d-8c0d-dd76da1f02a5" xmlns:ns3="16c05727-aa75-4e4a-9b5f-8a80a1165891" targetNamespace="http://schemas.microsoft.com/office/2006/metadata/properties" ma:root="true" ma:fieldsID="60e05723c5c1908df1a1a4ebf11d344e" ns2:_="" ns3:_="">
     <xsd:import namespace="71af3243-3dd4-4a8d-8c0d-dd76da1f02a5"/>
@@ -12609,15 +12656,6 @@
 </ct:contentTypeSchema>
 </file>
 
-<file path=customXml/item2.xml><?xml version="1.0" encoding="utf-8"?>
-<?mso-contentType ?>
-<FormTemplates xmlns="http://schemas.microsoft.com/sharepoint/v3/contenttype/forms">
-  <Display>DocumentLibraryForm</Display>
-  <Edit>DocumentLibraryForm</Edit>
-  <New>DocumentLibraryForm</New>
-</FormTemplates>
-</file>
-
 <file path=customXml/item3.xml><?xml version="1.0" encoding="utf-8"?>
 <p:properties xmlns:p="http://schemas.microsoft.com/office/2006/metadata/properties" xmlns:xsi="http://www.w3.org/2001/XMLSchema-instance" xmlns:pc="http://schemas.microsoft.com/office/infopath/2007/PartnerControls">
   <documentManagement>
@@ -12627,6 +12665,14 @@
 </file>
 
 <file path=customXml/itemProps1.xml><?xml version="1.0" encoding="utf-8"?>
+<ds:datastoreItem xmlns:ds="http://schemas.openxmlformats.org/officeDocument/2006/customXml" ds:itemID="{2B21BF1A-59D3-4E19-9B95-2FD4309AC3AF}">
+  <ds:schemaRefs>
+    <ds:schemaRef ds:uri="http://schemas.microsoft.com/sharepoint/v3/contenttype/forms"/>
+  </ds:schemaRefs>
+</ds:datastoreItem>
+</file>
+
+<file path=customXml/itemProps2.xml><?xml version="1.0" encoding="utf-8"?>
 <ds:datastoreItem xmlns:ds="http://schemas.openxmlformats.org/officeDocument/2006/customXml" ds:itemID="{1EED214C-B51A-4B75-8B08-0E0DBD2305BE}">
   <ds:schemaRefs>
     <ds:schemaRef ds:uri="http://schemas.microsoft.com/office/2006/metadata/contentType"/>
@@ -12641,14 +12687,6 @@
     <ds:schemaRef ds:uri="http://purl.org/dc/elements/1.1/"/>
     <ds:schemaRef ds:uri="http://purl.org/dc/terms/"/>
     <ds:schemaRef ds:uri="http://schemas.microsoft.com/internal/obd"/>
-  </ds:schemaRefs>
-</ds:datastoreItem>
-</file>
-
-<file path=customXml/itemProps2.xml><?xml version="1.0" encoding="utf-8"?>
-<ds:datastoreItem xmlns:ds="http://schemas.openxmlformats.org/officeDocument/2006/customXml" ds:itemID="{2B21BF1A-59D3-4E19-9B95-2FD4309AC3AF}">
-  <ds:schemaRefs>
-    <ds:schemaRef ds:uri="http://schemas.microsoft.com/sharepoint/v3/contenttype/forms"/>
   </ds:schemaRefs>
 </ds:datastoreItem>
 </file>

</xml_diff>